<commit_message>
Update GNA Hackathon 3.0 Presentation.pptx
</commit_message>
<xml_diff>
--- a/GNA Hackathon 3.0 Presentation.pptx
+++ b/GNA Hackathon 3.0 Presentation.pptx
@@ -205,7 +205,7 @@
           <a:p>
             <a:fld id="{90929B77-CEF6-6C4A-91BD-9AF4B602F1EC}" type="datetimeFigureOut">
               <a:rPr lang="en-US" smtClean="0"/>
-              <a:t>3/29/2025</a:t>
+              <a:t>3/30/2025</a:t>
             </a:fld>
             <a:endParaRPr lang="en-US"/>
           </a:p>
@@ -1742,7 +1742,7 @@
           <a:p>
             <a:fld id="{75B1E8F0-A069-C34B-9D9B-093629C94A0F}" type="datetimeFigureOut">
               <a:rPr lang="en-US" smtClean="0"/>
-              <a:t>3/29/2025</a:t>
+              <a:t>3/30/2025</a:t>
             </a:fld>
             <a:endParaRPr lang="en-US"/>
           </a:p>
@@ -1812,6 +1812,18 @@
   <p:clrMapOvr>
     <a:masterClrMapping/>
   </p:clrMapOvr>
+  <mc:AlternateContent xmlns:mc="http://schemas.openxmlformats.org/markup-compatibility/2006">
+    <mc:Choice xmlns:p14="http://schemas.microsoft.com/office/powerpoint/2010/main" Requires="p14">
+      <p:transition p14:dur="250">
+        <p:fade/>
+      </p:transition>
+    </mc:Choice>
+    <mc:Fallback>
+      <p:transition>
+        <p:fade/>
+      </p:transition>
+    </mc:Fallback>
+  </mc:AlternateContent>
 </p:sldLayout>
 </file>
 
@@ -1942,7 +1954,7 @@
           <a:p>
             <a:fld id="{75B1E8F0-A069-C34B-9D9B-093629C94A0F}" type="datetimeFigureOut">
               <a:rPr lang="en-US" smtClean="0"/>
-              <a:t>3/29/2025</a:t>
+              <a:t>3/30/2025</a:t>
             </a:fld>
             <a:endParaRPr lang="en-US"/>
           </a:p>
@@ -2012,6 +2024,18 @@
   <p:clrMapOvr>
     <a:masterClrMapping/>
   </p:clrMapOvr>
+  <mc:AlternateContent xmlns:mc="http://schemas.openxmlformats.org/markup-compatibility/2006">
+    <mc:Choice xmlns:p14="http://schemas.microsoft.com/office/powerpoint/2010/main" Requires="p14">
+      <p:transition p14:dur="250">
+        <p:fade/>
+      </p:transition>
+    </mc:Choice>
+    <mc:Fallback>
+      <p:transition>
+        <p:fade/>
+      </p:transition>
+    </mc:Fallback>
+  </mc:AlternateContent>
 </p:sldLayout>
 </file>
 
@@ -2152,7 +2176,7 @@
           <a:p>
             <a:fld id="{75B1E8F0-A069-C34B-9D9B-093629C94A0F}" type="datetimeFigureOut">
               <a:rPr lang="en-US" smtClean="0"/>
-              <a:t>3/29/2025</a:t>
+              <a:t>3/30/2025</a:t>
             </a:fld>
             <a:endParaRPr lang="en-US"/>
           </a:p>
@@ -2222,6 +2246,18 @@
   <p:clrMapOvr>
     <a:masterClrMapping/>
   </p:clrMapOvr>
+  <mc:AlternateContent xmlns:mc="http://schemas.openxmlformats.org/markup-compatibility/2006">
+    <mc:Choice xmlns:p14="http://schemas.microsoft.com/office/powerpoint/2010/main" Requires="p14">
+      <p:transition p14:dur="250">
+        <p:fade/>
+      </p:transition>
+    </mc:Choice>
+    <mc:Fallback>
+      <p:transition>
+        <p:fade/>
+      </p:transition>
+    </mc:Fallback>
+  </mc:AlternateContent>
 </p:sldLayout>
 </file>
 
@@ -2352,7 +2388,7 @@
           <a:p>
             <a:fld id="{75B1E8F0-A069-C34B-9D9B-093629C94A0F}" type="datetimeFigureOut">
               <a:rPr lang="en-US" smtClean="0"/>
-              <a:t>3/29/2025</a:t>
+              <a:t>3/30/2025</a:t>
             </a:fld>
             <a:endParaRPr lang="en-US"/>
           </a:p>
@@ -2422,6 +2458,18 @@
   <p:clrMapOvr>
     <a:masterClrMapping/>
   </p:clrMapOvr>
+  <mc:AlternateContent xmlns:mc="http://schemas.openxmlformats.org/markup-compatibility/2006">
+    <mc:Choice xmlns:p14="http://schemas.microsoft.com/office/powerpoint/2010/main" Requires="p14">
+      <p:transition p14:dur="250">
+        <p:fade/>
+      </p:transition>
+    </mc:Choice>
+    <mc:Fallback>
+      <p:transition>
+        <p:fade/>
+      </p:transition>
+    </mc:Fallback>
+  </mc:AlternateContent>
 </p:sldLayout>
 </file>
 
@@ -2628,7 +2676,7 @@
           <a:p>
             <a:fld id="{75B1E8F0-A069-C34B-9D9B-093629C94A0F}" type="datetimeFigureOut">
               <a:rPr lang="en-US" smtClean="0"/>
-              <a:t>3/29/2025</a:t>
+              <a:t>3/30/2025</a:t>
             </a:fld>
             <a:endParaRPr lang="en-US"/>
           </a:p>
@@ -2698,6 +2746,18 @@
   <p:clrMapOvr>
     <a:masterClrMapping/>
   </p:clrMapOvr>
+  <mc:AlternateContent xmlns:mc="http://schemas.openxmlformats.org/markup-compatibility/2006">
+    <mc:Choice xmlns:p14="http://schemas.microsoft.com/office/powerpoint/2010/main" Requires="p14">
+      <p:transition p14:dur="250">
+        <p:fade/>
+      </p:transition>
+    </mc:Choice>
+    <mc:Fallback>
+      <p:transition>
+        <p:fade/>
+      </p:transition>
+    </mc:Fallback>
+  </mc:AlternateContent>
 </p:sldLayout>
 </file>
 
@@ -2896,7 +2956,7 @@
           <a:p>
             <a:fld id="{75B1E8F0-A069-C34B-9D9B-093629C94A0F}" type="datetimeFigureOut">
               <a:rPr lang="en-US" smtClean="0"/>
-              <a:t>3/29/2025</a:t>
+              <a:t>3/30/2025</a:t>
             </a:fld>
             <a:endParaRPr lang="en-US"/>
           </a:p>
@@ -2966,6 +3026,18 @@
   <p:clrMapOvr>
     <a:masterClrMapping/>
   </p:clrMapOvr>
+  <mc:AlternateContent xmlns:mc="http://schemas.openxmlformats.org/markup-compatibility/2006">
+    <mc:Choice xmlns:p14="http://schemas.microsoft.com/office/powerpoint/2010/main" Requires="p14">
+      <p:transition p14:dur="250">
+        <p:fade/>
+      </p:transition>
+    </mc:Choice>
+    <mc:Fallback>
+      <p:transition>
+        <p:fade/>
+      </p:transition>
+    </mc:Fallback>
+  </mc:AlternateContent>
 </p:sldLayout>
 </file>
 
@@ -3311,7 +3383,7 @@
           <a:p>
             <a:fld id="{75B1E8F0-A069-C34B-9D9B-093629C94A0F}" type="datetimeFigureOut">
               <a:rPr lang="en-US" smtClean="0"/>
-              <a:t>3/29/2025</a:t>
+              <a:t>3/30/2025</a:t>
             </a:fld>
             <a:endParaRPr lang="en-US"/>
           </a:p>
@@ -3381,6 +3453,18 @@
   <p:clrMapOvr>
     <a:masterClrMapping/>
   </p:clrMapOvr>
+  <mc:AlternateContent xmlns:mc="http://schemas.openxmlformats.org/markup-compatibility/2006">
+    <mc:Choice xmlns:p14="http://schemas.microsoft.com/office/powerpoint/2010/main" Requires="p14">
+      <p:transition p14:dur="250">
+        <p:fade/>
+      </p:transition>
+    </mc:Choice>
+    <mc:Fallback>
+      <p:transition>
+        <p:fade/>
+      </p:transition>
+    </mc:Fallback>
+  </mc:AlternateContent>
 </p:sldLayout>
 </file>
 
@@ -3453,7 +3537,7 @@
           <a:p>
             <a:fld id="{75B1E8F0-A069-C34B-9D9B-093629C94A0F}" type="datetimeFigureOut">
               <a:rPr lang="en-US" smtClean="0"/>
-              <a:t>3/29/2025</a:t>
+              <a:t>3/30/2025</a:t>
             </a:fld>
             <a:endParaRPr lang="en-US"/>
           </a:p>
@@ -3523,6 +3607,18 @@
   <p:clrMapOvr>
     <a:masterClrMapping/>
   </p:clrMapOvr>
+  <mc:AlternateContent xmlns:mc="http://schemas.openxmlformats.org/markup-compatibility/2006">
+    <mc:Choice xmlns:p14="http://schemas.microsoft.com/office/powerpoint/2010/main" Requires="p14">
+      <p:transition p14:dur="250">
+        <p:fade/>
+      </p:transition>
+    </mc:Choice>
+    <mc:Fallback>
+      <p:transition>
+        <p:fade/>
+      </p:transition>
+    </mc:Fallback>
+  </mc:AlternateContent>
 </p:sldLayout>
 </file>
 
@@ -3566,7 +3662,7 @@
           <a:p>
             <a:fld id="{75B1E8F0-A069-C34B-9D9B-093629C94A0F}" type="datetimeFigureOut">
               <a:rPr lang="en-US" smtClean="0"/>
-              <a:t>3/29/2025</a:t>
+              <a:t>3/30/2025</a:t>
             </a:fld>
             <a:endParaRPr lang="en-US"/>
           </a:p>
@@ -3636,6 +3732,18 @@
   <p:clrMapOvr>
     <a:masterClrMapping/>
   </p:clrMapOvr>
+  <mc:AlternateContent xmlns:mc="http://schemas.openxmlformats.org/markup-compatibility/2006">
+    <mc:Choice xmlns:p14="http://schemas.microsoft.com/office/powerpoint/2010/main" Requires="p14">
+      <p:transition p14:dur="250">
+        <p:fade/>
+      </p:transition>
+    </mc:Choice>
+    <mc:Fallback>
+      <p:transition>
+        <p:fade/>
+      </p:transition>
+    </mc:Fallback>
+  </mc:AlternateContent>
 </p:sldLayout>
 </file>
 
@@ -3879,7 +3987,7 @@
           <a:p>
             <a:fld id="{75B1E8F0-A069-C34B-9D9B-093629C94A0F}" type="datetimeFigureOut">
               <a:rPr lang="en-US" smtClean="0"/>
-              <a:t>3/29/2025</a:t>
+              <a:t>3/30/2025</a:t>
             </a:fld>
             <a:endParaRPr lang="en-US"/>
           </a:p>
@@ -3949,6 +4057,18 @@
   <p:clrMapOvr>
     <a:masterClrMapping/>
   </p:clrMapOvr>
+  <mc:AlternateContent xmlns:mc="http://schemas.openxmlformats.org/markup-compatibility/2006">
+    <mc:Choice xmlns:p14="http://schemas.microsoft.com/office/powerpoint/2010/main" Requires="p14">
+      <p:transition p14:dur="250">
+        <p:fade/>
+      </p:transition>
+    </mc:Choice>
+    <mc:Fallback>
+      <p:transition>
+        <p:fade/>
+      </p:transition>
+    </mc:Fallback>
+  </mc:AlternateContent>
 </p:sldLayout>
 </file>
 
@@ -4168,7 +4288,7 @@
           <a:p>
             <a:fld id="{75B1E8F0-A069-C34B-9D9B-093629C94A0F}" type="datetimeFigureOut">
               <a:rPr lang="en-US" smtClean="0"/>
-              <a:t>3/29/2025</a:t>
+              <a:t>3/30/2025</a:t>
             </a:fld>
             <a:endParaRPr lang="en-US"/>
           </a:p>
@@ -4238,6 +4358,18 @@
   <p:clrMapOvr>
     <a:masterClrMapping/>
   </p:clrMapOvr>
+  <mc:AlternateContent xmlns:mc="http://schemas.openxmlformats.org/markup-compatibility/2006">
+    <mc:Choice xmlns:p14="http://schemas.microsoft.com/office/powerpoint/2010/main" Requires="p14">
+      <p:transition p14:dur="250">
+        <p:fade/>
+      </p:transition>
+    </mc:Choice>
+    <mc:Fallback>
+      <p:transition>
+        <p:fade/>
+      </p:transition>
+    </mc:Fallback>
+  </mc:AlternateContent>
 </p:sldLayout>
 </file>
 
@@ -4411,7 +4543,7 @@
           <a:p>
             <a:fld id="{75B1E8F0-A069-C34B-9D9B-093629C94A0F}" type="datetimeFigureOut">
               <a:rPr lang="en-US" smtClean="0"/>
-              <a:t>3/29/2025</a:t>
+              <a:t>3/30/2025</a:t>
             </a:fld>
             <a:endParaRPr lang="en-US"/>
           </a:p>
@@ -4528,6 +4660,18 @@
     <p:sldLayoutId id="2147483658" r:id="rId10"/>
     <p:sldLayoutId id="2147483659" r:id="rId11"/>
   </p:sldLayoutIdLst>
+  <mc:AlternateContent xmlns:mc="http://schemas.openxmlformats.org/markup-compatibility/2006">
+    <mc:Choice xmlns:p14="http://schemas.microsoft.com/office/powerpoint/2010/main" Requires="p14">
+      <p:transition p14:dur="250">
+        <p:fade/>
+      </p:transition>
+    </mc:Choice>
+    <mc:Fallback>
+      <p:transition>
+        <p:fade/>
+      </p:transition>
+    </mc:Fallback>
+  </mc:AlternateContent>
   <p:txStyles>
     <p:titleStyle>
       <a:lvl1pPr algn="l" defTabSz="914400" rtl="0" eaLnBrk="1" latinLnBrk="0" hangingPunct="1">
@@ -4842,8 +4986,8 @@
         </p:nvSpPr>
         <p:spPr>
           <a:xfrm>
-            <a:off x="681599" y="2015504"/>
-            <a:ext cx="10828801" cy="3686202"/>
+            <a:off x="681599" y="1997216"/>
+            <a:ext cx="10828801" cy="4285212"/>
           </a:xfrm>
           <a:prstGeom prst="rect">
             <a:avLst/>
@@ -4862,14 +5006,14 @@
               </a:lnSpc>
             </a:pPr>
             <a:r>
-              <a:rPr lang="en-US" sz="2400" b="1" dirty="0">
+              <a:rPr lang="en-US" sz="2800" b="1" dirty="0">
                 <a:latin typeface="Aptos" panose="020B0004020202020204" pitchFamily="34" charset="0"/>
                 <a:cs typeface="Arial" panose="020B0604020202020204" pitchFamily="34" charset="0"/>
               </a:rPr>
               <a:t>Theme: </a:t>
             </a:r>
             <a:r>
-              <a:rPr lang="en-US" sz="2400" dirty="0">
+              <a:rPr lang="en-US" sz="2800" dirty="0">
                 <a:latin typeface="Aptos" panose="020B0004020202020204" pitchFamily="34" charset="0"/>
                 <a:cs typeface="Arial" panose="020B0604020202020204" pitchFamily="34" charset="0"/>
               </a:rPr>
@@ -4883,14 +5027,14 @@
               </a:lnSpc>
             </a:pPr>
             <a:r>
-              <a:rPr lang="en-US" sz="2400" b="1" dirty="0">
+              <a:rPr lang="en-US" sz="2800" b="1" dirty="0">
                 <a:latin typeface="Aptos" panose="020B0004020202020204" pitchFamily="34" charset="0"/>
                 <a:cs typeface="Arial" panose="020B0604020202020204" pitchFamily="34" charset="0"/>
               </a:rPr>
               <a:t>Topic Name: </a:t>
             </a:r>
             <a:r>
-              <a:rPr lang="en-US" sz="2400" dirty="0">
+              <a:rPr lang="en-US" sz="2800" dirty="0">
                 <a:latin typeface="Aptos" panose="020B0004020202020204" pitchFamily="34" charset="0"/>
                 <a:cs typeface="Arial" panose="020B0604020202020204" pitchFamily="34" charset="0"/>
               </a:rPr>
@@ -4904,14 +5048,14 @@
               </a:lnSpc>
             </a:pPr>
             <a:r>
-              <a:rPr lang="en-US" sz="2400" b="1" dirty="0">
+              <a:rPr lang="en-US" sz="2800" b="1" dirty="0">
                 <a:latin typeface="Aptos" panose="020B0004020202020204" pitchFamily="34" charset="0"/>
                 <a:cs typeface="Arial" panose="020B0604020202020204" pitchFamily="34" charset="0"/>
               </a:rPr>
               <a:t>Category: </a:t>
             </a:r>
             <a:r>
-              <a:rPr lang="en-US" sz="2400" dirty="0">
+              <a:rPr lang="en-US" sz="2800" dirty="0">
                 <a:latin typeface="Aptos" panose="020B0004020202020204" pitchFamily="34" charset="0"/>
                 <a:cs typeface="Arial" panose="020B0604020202020204" pitchFamily="34" charset="0"/>
               </a:rPr>
@@ -4925,14 +5069,14 @@
               </a:lnSpc>
             </a:pPr>
             <a:r>
-              <a:rPr lang="en-US" sz="2400" b="1" dirty="0">
+              <a:rPr lang="en-US" sz="2800" b="1" dirty="0">
                 <a:latin typeface="Aptos" panose="020B0004020202020204" pitchFamily="34" charset="0"/>
                 <a:cs typeface="Arial" panose="020B0604020202020204" pitchFamily="34" charset="0"/>
               </a:rPr>
               <a:t>Team ID: </a:t>
             </a:r>
             <a:r>
-              <a:rPr lang="en-US" sz="2400" dirty="0">
+              <a:rPr lang="en-US" sz="2800" dirty="0">
                 <a:latin typeface="Aptos" panose="020B0004020202020204" pitchFamily="34" charset="0"/>
                 <a:cs typeface="Arial" panose="020B0604020202020204" pitchFamily="34" charset="0"/>
               </a:rPr>
@@ -4946,20 +5090,20 @@
               </a:lnSpc>
             </a:pPr>
             <a:r>
-              <a:rPr lang="en-US" sz="2400" b="1" dirty="0">
+              <a:rPr lang="en-US" sz="2800" b="1" dirty="0">
                 <a:latin typeface="Aptos" panose="020B0004020202020204" pitchFamily="34" charset="0"/>
                 <a:cs typeface="Arial" panose="020B0604020202020204" pitchFamily="34" charset="0"/>
               </a:rPr>
               <a:t>Team Name: </a:t>
             </a:r>
             <a:r>
-              <a:rPr lang="en-US" sz="2400" dirty="0">
+              <a:rPr lang="en-US" sz="2800" dirty="0">
                 <a:latin typeface="Aptos" panose="020B0004020202020204" pitchFamily="34" charset="0"/>
                 <a:cs typeface="Arial" panose="020B0604020202020204" pitchFamily="34" charset="0"/>
               </a:rPr>
               <a:t>The Rookies</a:t>
             </a:r>
-            <a:endParaRPr lang="en-IN" sz="2400" b="1" dirty="0">
+            <a:endParaRPr lang="en-IN" sz="2800" b="1" dirty="0">
               <a:latin typeface="Aptos" panose="020B0004020202020204" pitchFamily="34" charset="0"/>
               <a:cs typeface="Arial" panose="020B0604020202020204" pitchFamily="34" charset="0"/>
             </a:endParaRPr>
@@ -5096,6 +5240,18 @@
   <p:clrMapOvr>
     <a:masterClrMapping/>
   </p:clrMapOvr>
+  <mc:AlternateContent xmlns:mc="http://schemas.openxmlformats.org/markup-compatibility/2006">
+    <mc:Choice xmlns:p14="http://schemas.microsoft.com/office/powerpoint/2010/main" Requires="p14">
+      <p:transition p14:dur="250">
+        <p:fade/>
+      </p:transition>
+    </mc:Choice>
+    <mc:Fallback>
+      <p:transition>
+        <p:fade/>
+      </p:transition>
+    </mc:Fallback>
+  </mc:AlternateContent>
 </p:sld>
 </file>
 
@@ -5126,7 +5282,7 @@
         </p:nvSpPr>
         <p:spPr bwMode="auto">
           <a:xfrm>
-            <a:off x="426721" y="2087695"/>
+            <a:off x="426721" y="2133415"/>
             <a:ext cx="11338558" cy="3046988"/>
           </a:xfrm>
           <a:prstGeom prst="rect">
@@ -5166,16 +5322,22 @@
               <a:buChar char="•"/>
             </a:pPr>
             <a:r>
+              <a:rPr lang="en-US" sz="2400" dirty="0">
+                <a:cs typeface="Arial" pitchFamily="34" charset="0"/>
+              </a:rPr>
+              <a:t>Kids' </a:t>
+            </a:r>
+            <a:r>
               <a:rPr lang="en-US" sz="2400" b="1" dirty="0">
                 <a:cs typeface="Arial" pitchFamily="34" charset="0"/>
               </a:rPr>
-              <a:t>Learn by Doing with AR: </a:t>
+              <a:t>attention spans are shrinking</a:t>
             </a:r>
             <a:r>
               <a:rPr lang="en-US" sz="2400" dirty="0">
                 <a:cs typeface="Arial" pitchFamily="34" charset="0"/>
               </a:rPr>
-              <a:t>Kids can visualize math concepts, and understand science through interactive AR models, making learning fun and hands-on.</a:t>
+              <a:t>. Studies show that children today struggle to focus for more than 33 minutes at a time.</a:t>
             </a:r>
           </a:p>
           <a:p>
@@ -5184,28 +5346,22 @@
               <a:buChar char="•"/>
             </a:pPr>
             <a:r>
-              <a:rPr lang="en-US" sz="2400" b="1" dirty="0">
-                <a:cs typeface="Arial" pitchFamily="34" charset="0"/>
-              </a:rPr>
-              <a:t>Smart Tracking &amp; Adaptive Learning: </a:t>
-            </a:r>
-            <a:r>
               <a:rPr lang="en-US" sz="2400" dirty="0">
                 <a:cs typeface="Arial" pitchFamily="34" charset="0"/>
               </a:rPr>
-              <a:t>The app monitors progress in real-time, and adjusts lessons and quizzes to match each child’s learning pace and provide a </a:t>
-            </a:r>
-            <a:r>
-              <a:rPr lang="en-US" sz="2400" b="1" dirty="0">
-                <a:cs typeface="Arial" pitchFamily="34" charset="0"/>
-              </a:rPr>
-              <a:t>gamified</a:t>
-            </a:r>
+              <a:t>Traditional learning methods can lead to boredom and poor retention.</a:t>
+            </a:r>
+          </a:p>
+          <a:p>
+            <a:pPr marL="342900" indent="-342900" algn="just">
+              <a:buFont typeface="Arial" panose="020B0604020202020204" pitchFamily="34" charset="0"/>
+              <a:buChar char="•"/>
+            </a:pPr>
             <a:r>
               <a:rPr lang="en-US" sz="2400" dirty="0">
                 <a:cs typeface="Arial" pitchFamily="34" charset="0"/>
               </a:rPr>
-              <a:t> learning experience</a:t>
+              <a:t>Students struggle to visualize concepts with textbooks alone, making learning difficult.</a:t>
             </a:r>
           </a:p>
         </p:txBody>
@@ -5407,6 +5563,18 @@
   <p:clrMapOvr>
     <a:masterClrMapping/>
   </p:clrMapOvr>
+  <mc:AlternateContent xmlns:mc="http://schemas.openxmlformats.org/markup-compatibility/2006">
+    <mc:Choice xmlns:p14="http://schemas.microsoft.com/office/powerpoint/2010/main" Requires="p14">
+      <p:transition p14:dur="250">
+        <p:fade/>
+      </p:transition>
+    </mc:Choice>
+    <mc:Fallback>
+      <p:transition>
+        <p:fade/>
+      </p:transition>
+    </mc:Fallback>
+  </mc:AlternateContent>
 </p:sld>
 </file>
 
@@ -5742,6 +5910,18 @@
   <p:clrMapOvr>
     <a:masterClrMapping/>
   </p:clrMapOvr>
+  <mc:AlternateContent xmlns:mc="http://schemas.openxmlformats.org/markup-compatibility/2006">
+    <mc:Choice xmlns:p14="http://schemas.microsoft.com/office/powerpoint/2010/main" Requires="p14">
+      <p:transition p14:dur="250">
+        <p:fade/>
+      </p:transition>
+    </mc:Choice>
+    <mc:Fallback>
+      <p:transition>
+        <p:fade/>
+      </p:transition>
+    </mc:Fallback>
+  </mc:AlternateContent>
 </p:sld>
 </file>
 
@@ -5785,7 +5965,7 @@
         <p:spPr bwMode="auto">
           <a:xfrm>
             <a:off x="426721" y="2087695"/>
-            <a:ext cx="11338558" cy="461665"/>
+            <a:ext cx="11338558" cy="3046988"/>
           </a:xfrm>
           <a:prstGeom prst="rect">
             <a:avLst/>
@@ -5804,12 +5984,93 @@
           </a:bodyPr>
           <a:lstStyle/>
           <a:p>
-            <a:pPr algn="just"/>
+            <a:pPr marL="342900" indent="-342900" algn="just">
+              <a:buFont typeface="Arial" panose="020B0604020202020204" pitchFamily="34" charset="0"/>
+              <a:buChar char="•"/>
+            </a:pPr>
+            <a:r>
+              <a:rPr lang="en-US" sz="2400" b="1" dirty="0">
+                <a:cs typeface="Arial" pitchFamily="34" charset="0"/>
+              </a:rPr>
+              <a:t>Learn by Doing with AR: </a:t>
+            </a:r>
             <a:r>
               <a:rPr lang="en-US" sz="2400" dirty="0">
                 <a:cs typeface="Arial" pitchFamily="34" charset="0"/>
               </a:rPr>
-              <a:t>sample</a:t>
+              <a:t>Kids can visualize math concepts, and understand science through interactive AR models, making learning fun and hands-on.</a:t>
+            </a:r>
+          </a:p>
+          <a:p>
+            <a:pPr marL="342900" indent="-342900" algn="just">
+              <a:buFont typeface="Arial" panose="020B0604020202020204" pitchFamily="34" charset="0"/>
+              <a:buChar char="•"/>
+            </a:pPr>
+            <a:r>
+              <a:rPr lang="en-US" sz="2400" b="1" dirty="0">
+                <a:cs typeface="Arial" pitchFamily="34" charset="0"/>
+              </a:rPr>
+              <a:t>Adaptive Learning: </a:t>
+            </a:r>
+            <a:r>
+              <a:rPr lang="en-US" sz="2400" dirty="0" err="1">
+                <a:cs typeface="Arial" pitchFamily="34" charset="0"/>
+              </a:rPr>
+              <a:t>EduQuest</a:t>
+            </a:r>
+            <a:r>
+              <a:rPr lang="en-US" sz="2400" dirty="0">
+                <a:cs typeface="Arial" pitchFamily="34" charset="0"/>
+              </a:rPr>
+              <a:t> uses AI to adjust lessons and quizzes to match each child’s learning pace and provide a </a:t>
+            </a:r>
+            <a:r>
+              <a:rPr lang="en-US" sz="2400" b="1" dirty="0">
+                <a:cs typeface="Arial" pitchFamily="34" charset="0"/>
+              </a:rPr>
+              <a:t>gamified</a:t>
+            </a:r>
+            <a:r>
+              <a:rPr lang="en-US" sz="2400" dirty="0">
+                <a:cs typeface="Arial" pitchFamily="34" charset="0"/>
+              </a:rPr>
+              <a:t> learning experience.</a:t>
+            </a:r>
+          </a:p>
+          <a:p>
+            <a:pPr marL="342900" indent="-342900" algn="just">
+              <a:buFont typeface="Arial" panose="020B0604020202020204" pitchFamily="34" charset="0"/>
+              <a:buChar char="•"/>
+            </a:pPr>
+            <a:r>
+              <a:rPr lang="en-US" sz="2400" b="1" dirty="0">
+                <a:cs typeface="Arial" pitchFamily="34" charset="0"/>
+              </a:rPr>
+              <a:t>Streak System: </a:t>
+            </a:r>
+            <a:r>
+              <a:rPr lang="en-US" sz="2400" dirty="0">
+                <a:cs typeface="Arial" pitchFamily="34" charset="0"/>
+              </a:rPr>
+              <a:t>Keeps kids motivated with daily learning streaks and smart reminders to stay consistent.</a:t>
+            </a:r>
+          </a:p>
+          <a:p>
+            <a:pPr marL="342900" indent="-342900" algn="just">
+              <a:buFont typeface="Arial" panose="020B0604020202020204" pitchFamily="34" charset="0"/>
+              <a:buChar char="•"/>
+            </a:pPr>
+            <a:r>
+              <a:rPr lang="en-US" sz="2400" b="1" dirty="0">
+                <a:cs typeface="Arial" pitchFamily="34" charset="0"/>
+              </a:rPr>
+              <a:t>Gamification &amp; Leaderboards: </a:t>
+            </a:r>
+            <a:r>
+              <a:rPr lang="en-US" sz="2400" dirty="0">
+                <a:cs typeface="Arial" pitchFamily="34" charset="0"/>
+              </a:rPr>
+              <a:t>Rewards progress with points, badges, and leaderboards to encourage healthy competition.</a:t>
             </a:r>
           </a:p>
         </p:txBody>
@@ -6022,6 +6283,18 @@
   <p:clrMapOvr>
     <a:masterClrMapping/>
   </p:clrMapOvr>
+  <mc:AlternateContent xmlns:mc="http://schemas.openxmlformats.org/markup-compatibility/2006">
+    <mc:Choice xmlns:p14="http://schemas.microsoft.com/office/powerpoint/2010/main" Requires="p14">
+      <p:transition p14:dur="250">
+        <p:fade/>
+      </p:transition>
+    </mc:Choice>
+    <mc:Fallback>
+      <p:transition>
+        <p:fade/>
+      </p:transition>
+    </mc:Fallback>
+  </mc:AlternateContent>
 </p:sld>
 </file>
 
@@ -6065,7 +6338,7 @@
         <p:spPr bwMode="auto">
           <a:xfrm>
             <a:off x="426721" y="2087695"/>
-            <a:ext cx="11338558" cy="1938992"/>
+            <a:ext cx="11338558" cy="2677656"/>
           </a:xfrm>
           <a:prstGeom prst="rect">
             <a:avLst/>
@@ -6089,16 +6362,22 @@
               <a:buChar char="•"/>
             </a:pPr>
             <a:r>
+              <a:rPr lang="en-US" sz="2400" dirty="0">
+                <a:cs typeface="Arial" pitchFamily="34" charset="0"/>
+              </a:rPr>
+              <a:t>Gamified learning can improve student performance by up to </a:t>
+            </a:r>
+            <a:r>
               <a:rPr lang="en-US" sz="2400" b="1" dirty="0">
                 <a:cs typeface="Arial" pitchFamily="34" charset="0"/>
               </a:rPr>
-              <a:t>Enhanced Learning &amp; Accessibility for Kids: </a:t>
+              <a:t>89.45%</a:t>
             </a:r>
             <a:r>
               <a:rPr lang="en-US" sz="2400" dirty="0">
                 <a:cs typeface="Arial" pitchFamily="34" charset="0"/>
               </a:rPr>
-              <a:t>Personalized lessons and AR make education more engaging, interactive, and inclusive for young learners.</a:t>
+              <a:t> compared to traditional methods.¹</a:t>
             </a:r>
           </a:p>
           <a:p>
@@ -6110,8 +6389,20 @@
               <a:rPr lang="en-US" sz="2400" b="1" dirty="0">
                 <a:cs typeface="Arial" pitchFamily="34" charset="0"/>
               </a:rPr>
-              <a:t>Broader Educational &amp; Economic Reach: </a:t>
-            </a:r>
+              <a:t>76% </a:t>
+            </a:r>
+            <a:r>
+              <a:rPr lang="en-US" sz="2400" dirty="0">
+                <a:cs typeface="Arial" pitchFamily="34" charset="0"/>
+              </a:rPr>
+              <a:t>of students report that technology makes learning more engaging.²</a:t>
+            </a:r>
+          </a:p>
+          <a:p>
+            <a:pPr marL="457200" indent="-457200" algn="just">
+              <a:buFont typeface="Arial" panose="020B0604020202020204" pitchFamily="34" charset="0"/>
+              <a:buChar char="•"/>
+            </a:pPr>
             <a:r>
               <a:rPr lang="en-US" sz="2400" dirty="0">
                 <a:cs typeface="Arial" pitchFamily="34" charset="0"/>
@@ -6120,10 +6411,28 @@
             </a:r>
           </a:p>
           <a:p>
-            <a:pPr algn="just"/>
-            <a:endParaRPr lang="en-US" sz="2400" dirty="0">
-              <a:cs typeface="Arial" pitchFamily="34" charset="0"/>
-            </a:endParaRPr>
+            <a:pPr marL="457200" indent="-457200" algn="just">
+              <a:buFont typeface="Arial" panose="020B0604020202020204" pitchFamily="34" charset="0"/>
+              <a:buChar char="•"/>
+            </a:pPr>
+            <a:r>
+              <a:rPr lang="en-US" sz="2400" dirty="0">
+                <a:cs typeface="Arial" pitchFamily="34" charset="0"/>
+              </a:rPr>
+              <a:t>Teachers in primary schools have access to only about </a:t>
+            </a:r>
+            <a:r>
+              <a:rPr lang="en-US" sz="2400" b="1" dirty="0">
+                <a:cs typeface="Arial" pitchFamily="34" charset="0"/>
+              </a:rPr>
+              <a:t>46%</a:t>
+            </a:r>
+            <a:r>
+              <a:rPr lang="en-US" sz="2400" dirty="0">
+                <a:cs typeface="Arial" pitchFamily="34" charset="0"/>
+              </a:rPr>
+              <a:t> of the materials required to teach practical science effectively.³</a:t>
+            </a:r>
           </a:p>
         </p:txBody>
       </p:sp>
@@ -6325,6 +6634,70 @@
           </a:prstGeom>
         </p:spPr>
       </p:pic>
+      <p:sp>
+        <p:nvSpPr>
+          <p:cNvPr id="3" name="TextBox 8">
+            <a:extLst>
+              <a:ext uri="{FF2B5EF4-FFF2-40B4-BE49-F238E27FC236}">
+                <a16:creationId xmlns:a16="http://schemas.microsoft.com/office/drawing/2014/main" id="{BE197617-9B12-094E-B8B0-FE4C17C6C20E}"/>
+              </a:ext>
+            </a:extLst>
+          </p:cNvPr>
+          <p:cNvSpPr txBox="1">
+            <a:spLocks noChangeArrowheads="1"/>
+          </p:cNvSpPr>
+          <p:nvPr/>
+        </p:nvSpPr>
+        <p:spPr bwMode="auto">
+          <a:xfrm>
+            <a:off x="480299" y="5413063"/>
+            <a:ext cx="11338558" cy="1200329"/>
+          </a:xfrm>
+          <a:prstGeom prst="rect">
+            <a:avLst/>
+          </a:prstGeom>
+          <a:noFill/>
+          <a:ln w="9525">
+            <a:noFill/>
+            <a:miter lim="800000"/>
+            <a:headEnd/>
+            <a:tailEnd/>
+          </a:ln>
+        </p:spPr>
+        <p:txBody>
+          <a:bodyPr wrap="square">
+            <a:spAutoFit/>
+          </a:bodyPr>
+          <a:lstStyle/>
+          <a:p>
+            <a:pPr algn="just"/>
+            <a:r>
+              <a:rPr lang="en-US" sz="2400" dirty="0">
+                <a:cs typeface="Arial" pitchFamily="34" charset="0"/>
+              </a:rPr>
+              <a:t>¹Attotime</a:t>
+            </a:r>
+          </a:p>
+          <a:p>
+            <a:pPr algn="just"/>
+            <a:r>
+              <a:rPr lang="en-US" sz="2400" dirty="0">
+                <a:cs typeface="Arial" pitchFamily="34" charset="0"/>
+              </a:rPr>
+              <a:t>²EdWeek, “Technology in Schools: A Teacher Survey”, 2023</a:t>
+            </a:r>
+          </a:p>
+          <a:p>
+            <a:pPr algn="just"/>
+            <a:r>
+              <a:rPr lang="en-US" sz="2400" dirty="0">
+                <a:cs typeface="Arial" pitchFamily="34" charset="0"/>
+              </a:rPr>
+              <a:t>³Royal Society of Chemistry</a:t>
+            </a:r>
+          </a:p>
+        </p:txBody>
+      </p:sp>
     </p:spTree>
     <p:extLst>
       <p:ext uri="{BB962C8B-B14F-4D97-AF65-F5344CB8AC3E}">
@@ -6335,6 +6708,18 @@
   <p:clrMapOvr>
     <a:masterClrMapping/>
   </p:clrMapOvr>
+  <mc:AlternateContent xmlns:mc="http://schemas.openxmlformats.org/markup-compatibility/2006">
+    <mc:Choice xmlns:p14="http://schemas.microsoft.com/office/powerpoint/2010/main" Requires="p14">
+      <p:transition p14:dur="250">
+        <p:fade/>
+      </p:transition>
+    </mc:Choice>
+    <mc:Fallback>
+      <p:transition>
+        <p:fade/>
+      </p:transition>
+    </mc:Fallback>
+  </mc:AlternateContent>
 </p:sld>
 </file>
 
@@ -6378,7 +6763,7 @@
         <p:spPr bwMode="auto">
           <a:xfrm>
             <a:off x="426721" y="2087695"/>
-            <a:ext cx="11338558" cy="2308324"/>
+            <a:ext cx="11338558" cy="3046988"/>
           </a:xfrm>
           <a:prstGeom prst="rect">
             <a:avLst/>
@@ -6397,16 +6782,25 @@
           </a:bodyPr>
           <a:lstStyle/>
           <a:p>
-            <a:pPr marL="457200" indent="-457200" algn="just">
+            <a:pPr algn="just"/>
+            <a:r>
+              <a:rPr lang="en-US" sz="2400" dirty="0" err="1">
+                <a:cs typeface="Arial" pitchFamily="34" charset="0"/>
+              </a:rPr>
+              <a:t>EduQuest</a:t>
+            </a:r>
+            <a:r>
+              <a:rPr lang="en-US" sz="2400" dirty="0">
+                <a:cs typeface="Arial" pitchFamily="34" charset="0"/>
+              </a:rPr>
+              <a:t> will be built using:</a:t>
+            </a:r>
+          </a:p>
+          <a:p>
+            <a:pPr marL="914400" lvl="1" indent="-457200" algn="just">
               <a:buFont typeface="Arial" panose="020B0604020202020204" pitchFamily="34" charset="0"/>
               <a:buChar char="•"/>
             </a:pPr>
-            <a:r>
-              <a:rPr lang="en-US" sz="2400" dirty="0">
-                <a:cs typeface="Arial" pitchFamily="34" charset="0"/>
-              </a:rPr>
-              <a:t>The platform will be built using the </a:t>
-            </a:r>
             <a:r>
               <a:rPr lang="en-US" sz="2400" b="1" dirty="0">
                 <a:cs typeface="Arial" pitchFamily="34" charset="0"/>
@@ -6417,8 +6811,14 @@
               <a:rPr lang="en-US" sz="2400" dirty="0">
                 <a:cs typeface="Arial" pitchFamily="34" charset="0"/>
               </a:rPr>
-              <a:t> framework for the mobile app and </a:t>
-            </a:r>
+              <a:t> for the mobile app enabling cross-platform support.</a:t>
+            </a:r>
+          </a:p>
+          <a:p>
+            <a:pPr marL="914400" lvl="1" indent="-457200" algn="just">
+              <a:buFont typeface="Arial" panose="020B0604020202020204" pitchFamily="34" charset="0"/>
+              <a:buChar char="•"/>
+            </a:pPr>
             <a:r>
               <a:rPr lang="en-US" sz="2400" b="1" dirty="0">
                 <a:cs typeface="Arial" pitchFamily="34" charset="0"/>
@@ -6433,22 +6833,10 @@
             </a:r>
           </a:p>
           <a:p>
-            <a:pPr marL="457200" indent="-457200" algn="just">
+            <a:pPr marL="914400" lvl="1" indent="-457200" algn="just">
               <a:buFont typeface="Arial" panose="020B0604020202020204" pitchFamily="34" charset="0"/>
               <a:buChar char="•"/>
             </a:pPr>
-            <a:r>
-              <a:rPr lang="en-US" sz="2400" b="1" dirty="0">
-                <a:cs typeface="Arial" pitchFamily="34" charset="0"/>
-              </a:rPr>
-              <a:t>Implementation Process: </a:t>
-            </a:r>
-            <a:r>
-              <a:rPr lang="en-US" sz="2400" dirty="0">
-                <a:cs typeface="Arial" pitchFamily="34" charset="0"/>
-              </a:rPr>
-              <a:t>3D learning modules will be developed in Unity3D and integrated into Flutter. AI will analyze student interactions to create personalized learning paths. </a:t>
-            </a:r>
             <a:r>
               <a:rPr lang="en-US" sz="2400" b="1" dirty="0">
                 <a:cs typeface="Arial" pitchFamily="34" charset="0"/>
@@ -6459,14 +6847,26 @@
               <a:rPr lang="en-US" sz="2400" dirty="0">
                 <a:cs typeface="Arial" pitchFamily="34" charset="0"/>
               </a:rPr>
-              <a:t> will store progress and provide analytics for educators.</a:t>
-            </a:r>
-          </a:p>
-          <a:p>
-            <a:pPr algn="just"/>
+              <a:t> for authentication, storing progress, and providing analytics.</a:t>
+            </a:r>
+            <a:endParaRPr lang="en-US" sz="2400" b="1" dirty="0">
+              <a:cs typeface="Arial" pitchFamily="34" charset="0"/>
+            </a:endParaRPr>
+          </a:p>
+          <a:p>
+            <a:pPr lvl="1" algn="just"/>
             <a:endParaRPr lang="en-US" sz="2400" dirty="0">
               <a:cs typeface="Arial" pitchFamily="34" charset="0"/>
             </a:endParaRPr>
+          </a:p>
+          <a:p>
+            <a:pPr algn="just"/>
+            <a:r>
+              <a:rPr lang="en-US" sz="2400" dirty="0">
+                <a:cs typeface="Arial" pitchFamily="34" charset="0"/>
+              </a:rPr>
+              <a:t>Interactive lessons will be developed in the Unity game engine and integrated into Flutter. An OpenAI API will analyze student interactions to create personalized lesson.</a:t>
+            </a:r>
           </a:p>
         </p:txBody>
       </p:sp>
@@ -6678,6 +7078,18 @@
   <p:clrMapOvr>
     <a:masterClrMapping/>
   </p:clrMapOvr>
+  <mc:AlternateContent xmlns:mc="http://schemas.openxmlformats.org/markup-compatibility/2006">
+    <mc:Choice xmlns:p14="http://schemas.microsoft.com/office/powerpoint/2010/main" Requires="p14">
+      <p:transition p14:dur="250">
+        <p:fade/>
+      </p:transition>
+    </mc:Choice>
+    <mc:Fallback>
+      <p:transition>
+        <p:fade/>
+      </p:transition>
+    </mc:Fallback>
+  </mc:AlternateContent>
 </p:sld>
 </file>
 
@@ -6721,7 +7133,7 @@
         <p:spPr bwMode="auto">
           <a:xfrm>
             <a:off x="426721" y="2087695"/>
-            <a:ext cx="11338558" cy="2308324"/>
+            <a:ext cx="11338558" cy="2677656"/>
           </a:xfrm>
           <a:prstGeom prst="rect">
             <a:avLst/>
@@ -6740,76 +7152,106 @@
           </a:bodyPr>
           <a:lstStyle/>
           <a:p>
-            <a:pPr marL="457200" indent="-457200" algn="just">
+            <a:pPr marL="342900" indent="-342900" algn="just">
               <a:buFont typeface="Arial" panose="020B0604020202020204" pitchFamily="34" charset="0"/>
               <a:buChar char="•"/>
             </a:pPr>
             <a:r>
+              <a:rPr lang="en-US" sz="2400" b="1" dirty="0">
+                <a:cs typeface="Arial" pitchFamily="34" charset="0"/>
+              </a:rPr>
+              <a:t>Growth in Demand</a:t>
+            </a:r>
+          </a:p>
+          <a:p>
+            <a:pPr marL="800100" lvl="1" indent="-342900" algn="just">
+              <a:buFont typeface="Courier New" panose="02070309020205020404" pitchFamily="49" charset="0"/>
+              <a:buChar char="o"/>
+            </a:pPr>
+            <a:r>
               <a:rPr lang="en-US" sz="2400" dirty="0">
                 <a:cs typeface="Arial" pitchFamily="34" charset="0"/>
               </a:rPr>
-              <a:t>The platform will be built using the </a:t>
-            </a:r>
+              <a:t>EdTech market → $404B by 2025 (16.3% CAGR). (</a:t>
+            </a:r>
+            <a:r>
+              <a:rPr lang="en-US" sz="2400" dirty="0" err="1">
+                <a:cs typeface="Arial" pitchFamily="34" charset="0"/>
+              </a:rPr>
+              <a:t>HolonIQ</a:t>
+            </a:r>
+            <a:r>
+              <a:rPr lang="en-US" sz="2400" dirty="0">
+                <a:cs typeface="Arial" pitchFamily="34" charset="0"/>
+              </a:rPr>
+              <a:t>)</a:t>
+            </a:r>
+          </a:p>
+          <a:p>
+            <a:pPr marL="800100" lvl="1" indent="-342900" algn="just">
+              <a:buFont typeface="Courier New" panose="02070309020205020404" pitchFamily="49" charset="0"/>
+              <a:buChar char="o"/>
+            </a:pPr>
+            <a:r>
+              <a:rPr lang="en-US" sz="2400" dirty="0">
+                <a:cs typeface="Arial" pitchFamily="34" charset="0"/>
+              </a:rPr>
+              <a:t>AR in education → $7B by 2027. (</a:t>
+            </a:r>
+            <a:r>
+              <a:rPr lang="en-US" sz="2400" dirty="0" err="1">
+                <a:cs typeface="Arial" pitchFamily="34" charset="0"/>
+              </a:rPr>
+              <a:t>MarketsandMarkets</a:t>
+            </a:r>
+            <a:r>
+              <a:rPr lang="en-US" sz="2400" dirty="0">
+                <a:cs typeface="Arial" pitchFamily="34" charset="0"/>
+              </a:rPr>
+              <a:t>)</a:t>
+            </a:r>
+          </a:p>
+          <a:p>
+            <a:pPr lvl="1" algn="just"/>
+            <a:endParaRPr lang="en-US" sz="2400" dirty="0">
+              <a:cs typeface="Arial" pitchFamily="34" charset="0"/>
+            </a:endParaRPr>
+          </a:p>
+          <a:p>
+            <a:pPr marL="342900" indent="-342900" algn="just">
+              <a:buFont typeface="Arial" panose="020B0604020202020204" pitchFamily="34" charset="0"/>
+              <a:buChar char="•"/>
+            </a:pPr>
             <a:r>
               <a:rPr lang="en-US" sz="2400" b="1" dirty="0">
                 <a:cs typeface="Arial" pitchFamily="34" charset="0"/>
               </a:rPr>
-              <a:t>Flutter</a:t>
-            </a:r>
+              <a:t>Rising Adoption of Homeschooling &amp; Online Learning</a:t>
+            </a:r>
+          </a:p>
+          <a:p>
+            <a:pPr marL="800100" lvl="1" indent="-342900" algn="just">
+              <a:buFont typeface="Courier New" panose="02070309020205020404" pitchFamily="49" charset="0"/>
+              <a:buChar char="o"/>
+            </a:pPr>
             <a:r>
               <a:rPr lang="en-US" sz="2400" dirty="0">
                 <a:cs typeface="Arial" pitchFamily="34" charset="0"/>
               </a:rPr>
-              <a:t> framework for the mobile app and </a:t>
-            </a:r>
-            <a:r>
-              <a:rPr lang="en-US" sz="2400" b="1" dirty="0">
-                <a:cs typeface="Arial" pitchFamily="34" charset="0"/>
-              </a:rPr>
-              <a:t>Unity3D</a:t>
-            </a:r>
+              <a:t>75% of parents prefer digital tools. (Common Sense Media)</a:t>
+            </a:r>
+          </a:p>
+          <a:p>
+            <a:pPr marL="800100" lvl="1" indent="-342900" algn="just">
+              <a:buFont typeface="Courier New" panose="02070309020205020404" pitchFamily="49" charset="0"/>
+              <a:buChar char="o"/>
+            </a:pPr>
             <a:r>
               <a:rPr lang="en-US" sz="2400" dirty="0">
                 <a:cs typeface="Arial" pitchFamily="34" charset="0"/>
               </a:rPr>
-              <a:t> for AR implementation &amp; interactive learning.</a:t>
-            </a:r>
-          </a:p>
-          <a:p>
-            <a:pPr marL="457200" indent="-457200" algn="just">
-              <a:buFont typeface="Arial" panose="020B0604020202020204" pitchFamily="34" charset="0"/>
-              <a:buChar char="•"/>
-            </a:pPr>
-            <a:r>
-              <a:rPr lang="en-US" sz="2400" b="1" dirty="0">
-                <a:cs typeface="Arial" pitchFamily="34" charset="0"/>
-              </a:rPr>
-              <a:t>Implementation Process: </a:t>
-            </a:r>
-            <a:r>
-              <a:rPr lang="en-US" sz="2400" dirty="0">
-                <a:cs typeface="Arial" pitchFamily="34" charset="0"/>
-              </a:rPr>
-              <a:t>3D learning modules will be developed in Unity3D and integrated into Flutter. AI will analyze student interactions to create personalized learning paths. </a:t>
-            </a:r>
-            <a:r>
-              <a:rPr lang="en-US" sz="2400" b="1" dirty="0">
-                <a:cs typeface="Arial" pitchFamily="34" charset="0"/>
-              </a:rPr>
-              <a:t>Firebase</a:t>
-            </a:r>
-            <a:r>
-              <a:rPr lang="en-US" sz="2400" dirty="0">
-                <a:cs typeface="Arial" pitchFamily="34" charset="0"/>
-              </a:rPr>
-              <a:t> will store progress and provide analytics for educators.</a:t>
-            </a:r>
-          </a:p>
-          <a:p>
-            <a:pPr algn="just"/>
-            <a:endParaRPr lang="en-US" sz="2400" dirty="0">
-              <a:cs typeface="Arial" pitchFamily="34" charset="0"/>
-            </a:endParaRPr>
+              <a:t>Homeschooling up 56% in a decade. (NHERI)</a:t>
+            </a:r>
           </a:p>
         </p:txBody>
       </p:sp>
@@ -7021,6 +7463,18 @@
   <p:clrMapOvr>
     <a:masterClrMapping/>
   </p:clrMapOvr>
+  <mc:AlternateContent xmlns:mc="http://schemas.openxmlformats.org/markup-compatibility/2006">
+    <mc:Choice xmlns:p14="http://schemas.microsoft.com/office/powerpoint/2010/main" Requires="p14">
+      <p:transition p14:dur="250">
+        <p:fade/>
+      </p:transition>
+    </mc:Choice>
+    <mc:Fallback>
+      <p:transition>
+        <p:fade/>
+      </p:transition>
+    </mc:Fallback>
+  </mc:AlternateContent>
 </p:sld>
 </file>
 
@@ -7064,7 +7518,7 @@
         <p:spPr bwMode="auto">
           <a:xfrm>
             <a:off x="426721" y="2087695"/>
-            <a:ext cx="11338558" cy="2308324"/>
+            <a:ext cx="11338558" cy="3785652"/>
           </a:xfrm>
           <a:prstGeom prst="rect">
             <a:avLst/>
@@ -7091,13 +7545,31 @@
               <a:rPr lang="en-US" sz="2400" b="1" dirty="0">
                 <a:cs typeface="Arial" pitchFamily="34" charset="0"/>
               </a:rPr>
-              <a:t>Technical Feasibility:</a:t>
-            </a:r>
+              <a:t>Tech Readiness</a:t>
+            </a:r>
+          </a:p>
+          <a:p>
+            <a:pPr marL="914400" lvl="1" indent="-457200" algn="just">
+              <a:buFont typeface="Courier New" panose="02070309020205020404" pitchFamily="49" charset="0"/>
+              <a:buChar char="o"/>
+            </a:pPr>
             <a:r>
               <a:rPr lang="en-US" sz="2400" dirty="0">
                 <a:cs typeface="Arial" pitchFamily="34" charset="0"/>
               </a:rPr>
-              <a:t> The integration of AR and AI is achievable using existing frameworks, ensuring smooth implementation.</a:t>
+              <a:t>Built with Flutter &amp; Unity3D, ensuring cross-platform compatibility.</a:t>
+            </a:r>
+          </a:p>
+          <a:p>
+            <a:pPr marL="914400" lvl="1" indent="-457200" algn="just">
+              <a:buFont typeface="Courier New" panose="02070309020205020404" pitchFamily="49" charset="0"/>
+              <a:buChar char="o"/>
+            </a:pPr>
+            <a:r>
+              <a:rPr lang="en-US" sz="2400" dirty="0">
+                <a:cs typeface="Arial" pitchFamily="34" charset="0"/>
+              </a:rPr>
+              <a:t>AI &amp; AR tools are mature and widely adopted in EdTech.</a:t>
             </a:r>
           </a:p>
           <a:p>
@@ -7109,14 +7581,35 @@
               <a:rPr lang="en-US" sz="2400" b="1" dirty="0">
                 <a:cs typeface="Arial" pitchFamily="34" charset="0"/>
               </a:rPr>
-              <a:t>Potential Challenges: </a:t>
-            </a:r>
+              <a:t>Scalability &amp; Monetization</a:t>
+            </a:r>
+          </a:p>
+          <a:p>
+            <a:pPr marL="914400" lvl="1" indent="-457200" algn="just">
+              <a:buFont typeface="Courier New" panose="02070309020205020404" pitchFamily="49" charset="0"/>
+              <a:buChar char="o"/>
+            </a:pPr>
             <a:r>
               <a:rPr lang="en-US" sz="2400" dirty="0">
                 <a:cs typeface="Arial" pitchFamily="34" charset="0"/>
               </a:rPr>
-              <a:t>Hardware limitations, internet dependency, and user adaptation may affect accessibility and engagement.</a:t>
-            </a:r>
+              <a:t>Freemium model with premium features (AI insights, advanced AR)</a:t>
+            </a:r>
+          </a:p>
+          <a:p>
+            <a:pPr marL="914400" lvl="1" indent="-457200" algn="just">
+              <a:buFont typeface="Courier New" panose="02070309020205020404" pitchFamily="49" charset="0"/>
+              <a:buChar char="o"/>
+            </a:pPr>
+            <a:r>
+              <a:rPr lang="en-US" sz="2400" dirty="0">
+                <a:cs typeface="Arial" pitchFamily="34" charset="0"/>
+              </a:rPr>
+              <a:t>Partnerships with schools &amp; EdTech platforms for B2B growth.</a:t>
+            </a:r>
+            <a:endParaRPr lang="en-US" sz="2400" b="1" dirty="0">
+              <a:cs typeface="Arial" pitchFamily="34" charset="0"/>
+            </a:endParaRPr>
           </a:p>
           <a:p>
             <a:pPr marL="457200" indent="-457200" algn="just">
@@ -7127,14 +7620,41 @@
               <a:rPr lang="en-US" sz="2400" b="1" dirty="0">
                 <a:cs typeface="Arial" pitchFamily="34" charset="0"/>
               </a:rPr>
-              <a:t>Overcoming Challenges: </a:t>
-            </a:r>
+              <a:t>Implementation Ease</a:t>
+            </a:r>
+          </a:p>
+          <a:p>
+            <a:pPr marL="914400" lvl="1" indent="-457200" algn="just">
+              <a:buFont typeface="Courier New" panose="02070309020205020404" pitchFamily="49" charset="0"/>
+              <a:buChar char="o"/>
+            </a:pPr>
             <a:r>
               <a:rPr lang="en-US" sz="2400" dirty="0">
                 <a:cs typeface="Arial" pitchFamily="34" charset="0"/>
               </a:rPr>
-              <a:t>Optimized AR for low-end devices, offline learning modes, and intuitive UI/UX design will enhance usability.</a:t>
-            </a:r>
+              <a:t>Uses existing AI &amp; AR frameworks, reducing development time.</a:t>
+            </a:r>
+          </a:p>
+          <a:p>
+            <a:pPr marL="914400" lvl="1" indent="-457200" algn="just">
+              <a:buFont typeface="Courier New" panose="02070309020205020404" pitchFamily="49" charset="0"/>
+              <a:buChar char="o"/>
+            </a:pPr>
+            <a:r>
+              <a:rPr lang="en-US" sz="2400" dirty="0">
+                <a:cs typeface="Arial" pitchFamily="34" charset="0"/>
+              </a:rPr>
+              <a:t>Cloud-based backend (Firebase) ensures seamless updates and scalability.</a:t>
+            </a:r>
+          </a:p>
+          <a:p>
+            <a:pPr marL="914400" lvl="1" indent="-457200" algn="just">
+              <a:buFont typeface="Arial" panose="020B0604020202020204" pitchFamily="34" charset="0"/>
+              <a:buChar char="•"/>
+            </a:pPr>
+            <a:endParaRPr lang="en-US" sz="2400" dirty="0">
+              <a:cs typeface="Arial" pitchFamily="34" charset="0"/>
+            </a:endParaRPr>
           </a:p>
         </p:txBody>
       </p:sp>
@@ -7346,6 +7866,18 @@
   <p:clrMapOvr>
     <a:masterClrMapping/>
   </p:clrMapOvr>
+  <mc:AlternateContent xmlns:mc="http://schemas.openxmlformats.org/markup-compatibility/2006">
+    <mc:Choice xmlns:p14="http://schemas.microsoft.com/office/powerpoint/2010/main" Requires="p14">
+      <p:transition p14:dur="250">
+        <p:fade/>
+      </p:transition>
+    </mc:Choice>
+    <mc:Fallback>
+      <p:transition>
+        <p:fade/>
+      </p:transition>
+    </mc:Fallback>
+  </mc:AlternateContent>
 </p:sld>
 </file>
 
@@ -7949,13 +8481,7 @@
                         <a:rPr lang="en-US" dirty="0">
                           <a:hlinkClick r:id="rId6"/>
                         </a:rPr>
-                        <a:t>a</a:t>
-                      </a:r>
-                      <a:r>
-                        <a:rPr lang="en-US" dirty="0">
-                          <a:hlinkClick r:id="rId6"/>
-                        </a:rPr>
-                        <a:t>nish905699@</a:t>
+                        <a:t>anish905699@</a:t>
                       </a:r>
                     </a:p>
                     <a:p>
@@ -8051,13 +8577,7 @@
                         <a:rPr lang="en-US" dirty="0">
                           <a:hlinkClick r:id="rId7"/>
                         </a:rPr>
-                        <a:t>k</a:t>
-                      </a:r>
-                      <a:r>
-                        <a:rPr lang="en-US" dirty="0">
-                          <a:hlinkClick r:id="rId7"/>
-                        </a:rPr>
-                        <a:t>rishnakanda33@</a:t>
+                        <a:t>krishnakanda33@</a:t>
                       </a:r>
                     </a:p>
                     <a:p>
@@ -8108,6 +8628,18 @@
   <p:clrMapOvr>
     <a:masterClrMapping/>
   </p:clrMapOvr>
+  <mc:AlternateContent xmlns:mc="http://schemas.openxmlformats.org/markup-compatibility/2006">
+    <mc:Choice xmlns:p14="http://schemas.microsoft.com/office/powerpoint/2010/main" Requires="p14">
+      <p:transition p14:dur="250">
+        <p:fade/>
+      </p:transition>
+    </mc:Choice>
+    <mc:Fallback>
+      <p:transition>
+        <p:fade/>
+      </p:transition>
+    </mc:Fallback>
+  </mc:AlternateContent>
 </p:sld>
 </file>
 

</xml_diff>